<commit_message>
Ajout développement et pseudo code
</commit_message>
<xml_diff>
--- a/Présentation.pptx
+++ b/Présentation.pptx
@@ -1,6 +1,6 @@
 
 <file path=ppt/presentation.xml><?xml version="1.0" encoding="utf-8"?>
-<p:presentation xmlns:a="http://schemas.openxmlformats.org/drawingml/2006/main" xmlns:r="http://schemas.openxmlformats.org/officeDocument/2006/relationships" xmlns:p="http://schemas.openxmlformats.org/presentationml/2006/main" autoCompressPictures="0">
+<p:presentation xmlns:a="http://schemas.openxmlformats.org/drawingml/2006/main" xmlns:r="http://schemas.openxmlformats.org/officeDocument/2006/relationships" xmlns:p="http://schemas.openxmlformats.org/presentationml/2006/main" saveSubsetFonts="1" autoCompressPictures="0">
   <p:sldMasterIdLst>
     <p:sldMasterId id="2147483648" r:id="rId1"/>
   </p:sldMasterIdLst>
@@ -8,11 +8,12 @@
     <p:sldId id="256" r:id="rId2"/>
     <p:sldId id="257" r:id="rId3"/>
     <p:sldId id="258" r:id="rId4"/>
-    <p:sldId id="260" r:id="rId5"/>
-    <p:sldId id="261" r:id="rId6"/>
-    <p:sldId id="263" r:id="rId7"/>
-    <p:sldId id="259" r:id="rId8"/>
-    <p:sldId id="265" r:id="rId9"/>
+    <p:sldId id="267" r:id="rId5"/>
+    <p:sldId id="268" r:id="rId6"/>
+    <p:sldId id="261" r:id="rId7"/>
+    <p:sldId id="263" r:id="rId8"/>
+    <p:sldId id="259" r:id="rId9"/>
+    <p:sldId id="265" r:id="rId10"/>
   </p:sldIdLst>
   <p:sldSz cx="12192000" cy="6858000"/>
   <p:notesSz cx="6858000" cy="9144000"/>
@@ -622,7 +623,7 @@
             <a:fld id="{B61BEF0D-F0BB-DE4B-95CE-6DB70DBA9567}" type="datetimeFigureOut">
               <a:rPr lang="en-US" dirty="0"/>
               <a:pPr/>
-              <a:t>3/30/2017</a:t>
+              <a:t>3/30/17</a:t>
             </a:fld>
             <a:endParaRPr lang="en-US" dirty="0"/>
           </a:p>
@@ -915,7 +916,7 @@
             <a:fld id="{B61BEF0D-F0BB-DE4B-95CE-6DB70DBA9567}" type="datetimeFigureOut">
               <a:rPr lang="en-US" dirty="0"/>
               <a:pPr/>
-              <a:t>3/30/2017</a:t>
+              <a:t>3/30/17</a:t>
             </a:fld>
             <a:endParaRPr lang="en-US" dirty="0"/>
           </a:p>
@@ -1160,7 +1161,7 @@
             <a:fld id="{B61BEF0D-F0BB-DE4B-95CE-6DB70DBA9567}" type="datetimeFigureOut">
               <a:rPr lang="en-US" dirty="0"/>
               <a:pPr/>
-              <a:t>3/30/2017</a:t>
+              <a:t>3/30/17</a:t>
             </a:fld>
             <a:endParaRPr lang="en-US" dirty="0"/>
           </a:p>
@@ -1697,7 +1698,7 @@
             <a:fld id="{B61BEF0D-F0BB-DE4B-95CE-6DB70DBA9567}" type="datetimeFigureOut">
               <a:rPr lang="en-US" dirty="0"/>
               <a:pPr/>
-              <a:t>3/30/2017</a:t>
+              <a:t>3/30/17</a:t>
             </a:fld>
             <a:endParaRPr lang="en-US" dirty="0"/>
           </a:p>
@@ -1942,7 +1943,7 @@
             <a:fld id="{B61BEF0D-F0BB-DE4B-95CE-6DB70DBA9567}" type="datetimeFigureOut">
               <a:rPr lang="en-US" dirty="0"/>
               <a:pPr/>
-              <a:t>3/30/2017</a:t>
+              <a:t>3/30/17</a:t>
             </a:fld>
             <a:endParaRPr lang="en-US" dirty="0"/>
           </a:p>
@@ -2471,7 +2472,7 @@
             <a:fld id="{B61BEF0D-F0BB-DE4B-95CE-6DB70DBA9567}" type="datetimeFigureOut">
               <a:rPr lang="en-US" dirty="0"/>
               <a:pPr/>
-              <a:t>3/30/2017</a:t>
+              <a:t>3/30/17</a:t>
             </a:fld>
             <a:endParaRPr lang="en-US" dirty="0"/>
           </a:p>
@@ -2765,7 +2766,7 @@
             <a:fld id="{B61BEF0D-F0BB-DE4B-95CE-6DB70DBA9567}" type="datetimeFigureOut">
               <a:rPr lang="en-US" dirty="0"/>
               <a:pPr/>
-              <a:t>3/30/2017</a:t>
+              <a:t>3/30/17</a:t>
             </a:fld>
             <a:endParaRPr lang="en-US" dirty="0"/>
           </a:p>
@@ -2936,7 +2937,7 @@
             <a:fld id="{B61BEF0D-F0BB-DE4B-95CE-6DB70DBA9567}" type="datetimeFigureOut">
               <a:rPr lang="en-US" dirty="0"/>
               <a:pPr/>
-              <a:t>3/30/2017</a:t>
+              <a:t>3/30/17</a:t>
             </a:fld>
             <a:endParaRPr lang="en-US" dirty="0"/>
           </a:p>
@@ -3113,7 +3114,7 @@
             <a:fld id="{B61BEF0D-F0BB-DE4B-95CE-6DB70DBA9567}" type="datetimeFigureOut">
               <a:rPr lang="en-US" dirty="0"/>
               <a:pPr/>
-              <a:t>3/30/2017</a:t>
+              <a:t>3/30/17</a:t>
             </a:fld>
             <a:endParaRPr lang="en-US" dirty="0"/>
           </a:p>
@@ -3280,7 +3281,7 @@
             <a:fld id="{B61BEF0D-F0BB-DE4B-95CE-6DB70DBA9567}" type="datetimeFigureOut">
               <a:rPr lang="en-US" dirty="0"/>
               <a:pPr/>
-              <a:t>3/30/2017</a:t>
+              <a:t>3/30/17</a:t>
             </a:fld>
             <a:endParaRPr lang="en-US" dirty="0"/>
           </a:p>
@@ -3528,7 +3529,7 @@
             <a:fld id="{B61BEF0D-F0BB-DE4B-95CE-6DB70DBA9567}" type="datetimeFigureOut">
               <a:rPr lang="en-US" dirty="0"/>
               <a:pPr/>
-              <a:t>3/30/2017</a:t>
+              <a:t>3/30/17</a:t>
             </a:fld>
             <a:endParaRPr lang="en-US" dirty="0"/>
           </a:p>
@@ -3822,7 +3823,7 @@
             <a:fld id="{B61BEF0D-F0BB-DE4B-95CE-6DB70DBA9567}" type="datetimeFigureOut">
               <a:rPr lang="en-US" dirty="0"/>
               <a:pPr/>
-              <a:t>3/30/2017</a:t>
+              <a:t>3/30/17</a:t>
             </a:fld>
             <a:endParaRPr lang="en-US" dirty="0"/>
           </a:p>
@@ -4261,7 +4262,7 @@
             <a:fld id="{B61BEF0D-F0BB-DE4B-95CE-6DB70DBA9567}" type="datetimeFigureOut">
               <a:rPr lang="en-US" dirty="0"/>
               <a:pPr/>
-              <a:t>3/30/2017</a:t>
+              <a:t>3/30/17</a:t>
             </a:fld>
             <a:endParaRPr lang="en-US" dirty="0"/>
           </a:p>
@@ -4376,7 +4377,7 @@
             <a:fld id="{B61BEF0D-F0BB-DE4B-95CE-6DB70DBA9567}" type="datetimeFigureOut">
               <a:rPr lang="en-US" dirty="0"/>
               <a:pPr/>
-              <a:t>3/30/2017</a:t>
+              <a:t>3/30/17</a:t>
             </a:fld>
             <a:endParaRPr lang="en-US" dirty="0"/>
           </a:p>
@@ -4468,7 +4469,7 @@
             <a:fld id="{B61BEF0D-F0BB-DE4B-95CE-6DB70DBA9567}" type="datetimeFigureOut">
               <a:rPr lang="en-US" dirty="0"/>
               <a:pPr/>
-              <a:t>3/30/2017</a:t>
+              <a:t>3/30/17</a:t>
             </a:fld>
             <a:endParaRPr lang="en-US" dirty="0"/>
           </a:p>
@@ -4748,7 +4749,7 @@
             <a:fld id="{B61BEF0D-F0BB-DE4B-95CE-6DB70DBA9567}" type="datetimeFigureOut">
               <a:rPr lang="en-US" dirty="0"/>
               <a:pPr/>
-              <a:t>3/30/2017</a:t>
+              <a:t>3/30/17</a:t>
             </a:fld>
             <a:endParaRPr lang="en-US" dirty="0"/>
           </a:p>
@@ -5036,7 +5037,7 @@
             <a:fld id="{B61BEF0D-F0BB-DE4B-95CE-6DB70DBA9567}" type="datetimeFigureOut">
               <a:rPr lang="en-US" dirty="0"/>
               <a:pPr/>
-              <a:t>3/30/2017</a:t>
+              <a:t>3/30/17</a:t>
             </a:fld>
             <a:endParaRPr lang="en-US" dirty="0"/>
           </a:p>
@@ -5573,7 +5574,7 @@
             <a:fld id="{B61BEF0D-F0BB-DE4B-95CE-6DB70DBA9567}" type="datetimeFigureOut">
               <a:rPr lang="en-US" dirty="0"/>
               <a:pPr/>
-              <a:t>3/30/2017</a:t>
+              <a:t>3/30/17</a:t>
             </a:fld>
             <a:endParaRPr lang="en-US" dirty="0"/>
           </a:p>
@@ -6162,6 +6163,13 @@
   <p:clrMapOvr>
     <a:masterClrMapping/>
   </p:clrMapOvr>
+  <p:timing>
+    <p:tnLst>
+      <p:par>
+        <p:cTn id="1" dur="indefinite" restart="never" nodeType="tmRoot"/>
+      </p:par>
+    </p:tnLst>
+  </p:timing>
 </p:sld>
 </file>
 
@@ -6313,6 +6321,13 @@
   <p:clrMapOvr>
     <a:masterClrMapping/>
   </p:clrMapOvr>
+  <p:timing>
+    <p:tnLst>
+      <p:par>
+        <p:cTn id="1" dur="indefinite" restart="never" nodeType="tmRoot"/>
+      </p:par>
+    </p:tnLst>
+  </p:timing>
 </p:sld>
 </file>
 
@@ -6488,6 +6503,13 @@
   <p:clrMapOvr>
     <a:masterClrMapping/>
   </p:clrMapOvr>
+  <p:timing>
+    <p:tnLst>
+      <p:par>
+        <p:cTn id="1" dur="indefinite" restart="never" nodeType="tmRoot"/>
+      </p:par>
+    </p:tnLst>
+  </p:timing>
 </p:sld>
 </file>
 
@@ -6520,13 +6542,13 @@
         </p:nvSpPr>
         <p:spPr>
           <a:xfrm>
-            <a:off x="1879777" y="-96394"/>
-            <a:ext cx="8574622" cy="1196146"/>
+            <a:off x="1879777" y="-96395"/>
+            <a:ext cx="8574622" cy="1707081"/>
           </a:xfrm>
         </p:spPr>
         <p:txBody>
           <a:bodyPr>
-            <a:noAutofit/>
+            <a:normAutofit/>
           </a:bodyPr>
           <a:lstStyle/>
           <a:p>
@@ -6539,41 +6561,1131 @@
           </a:p>
         </p:txBody>
       </p:sp>
-      <p:sp>
-        <p:nvSpPr>
-          <p:cNvPr id="3" name="Sous-titre 2"/>
-          <p:cNvSpPr>
-            <a:spLocks noGrp="1"/>
-          </p:cNvSpPr>
-          <p:nvPr>
-            <p:ph type="subTitle" idx="1"/>
-          </p:nvPr>
-        </p:nvSpPr>
-        <p:spPr>
-          <a:xfrm>
-            <a:off x="3184994" y="2100354"/>
-            <a:ext cx="6987645" cy="3637715"/>
-          </a:xfrm>
-        </p:spPr>
-        <p:txBody>
-          <a:bodyPr/>
-          <a:lstStyle/>
-          <a:p>
-            <a:pPr algn="l"/>
-            <a:endParaRPr lang="fr-FR" dirty="0"/>
-          </a:p>
-        </p:txBody>
-      </p:sp>
+      <mc:AlternateContent xmlns:mc="http://schemas.openxmlformats.org/markup-compatibility/2006">
+        <mc:Choice xmlns:a14="http://schemas.microsoft.com/office/drawing/2010/main" Requires="a14">
+          <p:sp>
+            <p:nvSpPr>
+              <p:cNvPr id="3" name="Sous-titre 2"/>
+              <p:cNvSpPr>
+                <a:spLocks noGrp="1"/>
+              </p:cNvSpPr>
+              <p:nvPr>
+                <p:ph type="subTitle" idx="1"/>
+              </p:nvPr>
+            </p:nvSpPr>
+            <p:spPr>
+              <a:xfrm>
+                <a:off x="801985" y="1706327"/>
+                <a:ext cx="10730205" cy="4873096"/>
+              </a:xfrm>
+            </p:spPr>
+            <p:txBody>
+              <a:bodyPr/>
+              <a:lstStyle/>
+              <a:p>
+                <a:pPr marL="342900" indent="-342900" algn="l">
+                  <a:buFontTx/>
+                  <a:buChar char="-"/>
+                </a:pPr>
+                <a:endParaRPr lang="fr-FR" dirty="0" smtClean="0"/>
+              </a:p>
+              <a:p>
+                <a:pPr marL="342900" indent="-342900" algn="l">
+                  <a:buFont typeface="Arial" charset="0"/>
+                  <a:buChar char="•"/>
+                </a:pPr>
+                <a:r>
+                  <a:rPr lang="fr-FR" dirty="0" smtClean="0"/>
+                  <a:t>Écriture en base x :  </a:t>
+                </a:r>
+                <a14:m>
+                  <m:oMath xmlns:m="http://schemas.openxmlformats.org/officeDocument/2006/math">
+                    <m:sSub>
+                      <m:sSubPr>
+                        <m:ctrlPr>
+                          <a:rPr lang="fr-FR" i="1" smtClean="0"/>
+                        </m:ctrlPr>
+                      </m:sSubPr>
+                      <m:e>
+                        <m:r>
+                          <m:rPr>
+                            <m:sty m:val="p"/>
+                          </m:rPr>
+                          <a:rPr lang="fr-FR"/>
+                          <m:t>a</m:t>
+                        </m:r>
+                      </m:e>
+                      <m:sub>
+                        <m:r>
+                          <m:rPr>
+                            <m:sty m:val="p"/>
+                          </m:rPr>
+                          <a:rPr lang="fr-FR"/>
+                          <m:t>d</m:t>
+                        </m:r>
+                      </m:sub>
+                    </m:sSub>
+                    <m:sSup>
+                      <m:sSupPr>
+                        <m:ctrlPr>
+                          <a:rPr lang="fr-FR" i="1"/>
+                        </m:ctrlPr>
+                      </m:sSupPr>
+                      <m:e>
+                        <m:r>
+                          <m:rPr>
+                            <m:sty m:val="p"/>
+                          </m:rPr>
+                          <a:rPr lang="fr-FR"/>
+                          <m:t>x</m:t>
+                        </m:r>
+                      </m:e>
+                      <m:sup>
+                        <m:r>
+                          <m:rPr>
+                            <m:sty m:val="p"/>
+                          </m:rPr>
+                          <a:rPr lang="fr-FR"/>
+                          <m:t>d</m:t>
+                        </m:r>
+                      </m:sup>
+                    </m:sSup>
+                    <m:r>
+                      <a:rPr lang="fr-FR"/>
+                      <m:t>+</m:t>
+                    </m:r>
+                    <m:sSub>
+                      <m:sSubPr>
+                        <m:ctrlPr>
+                          <a:rPr lang="fr-FR" i="1"/>
+                        </m:ctrlPr>
+                      </m:sSubPr>
+                      <m:e>
+                        <m:r>
+                          <m:rPr>
+                            <m:sty m:val="p"/>
+                          </m:rPr>
+                          <a:rPr lang="fr-FR"/>
+                          <m:t>a</m:t>
+                        </m:r>
+                      </m:e>
+                      <m:sub>
+                        <m:r>
+                          <m:rPr>
+                            <m:sty m:val="p"/>
+                          </m:rPr>
+                          <a:rPr lang="fr-FR"/>
+                          <m:t>d</m:t>
+                        </m:r>
+                        <m:r>
+                          <a:rPr lang="fr-FR"/>
+                          <m:t>−1</m:t>
+                        </m:r>
+                      </m:sub>
+                    </m:sSub>
+                    <m:sSup>
+                      <m:sSupPr>
+                        <m:ctrlPr>
+                          <a:rPr lang="fr-FR" i="1"/>
+                        </m:ctrlPr>
+                      </m:sSupPr>
+                      <m:e>
+                        <m:r>
+                          <m:rPr>
+                            <m:sty m:val="p"/>
+                          </m:rPr>
+                          <a:rPr lang="fr-FR"/>
+                          <m:t>x</m:t>
+                        </m:r>
+                      </m:e>
+                      <m:sup>
+                        <m:r>
+                          <m:rPr>
+                            <m:sty m:val="p"/>
+                          </m:rPr>
+                          <a:rPr lang="fr-FR"/>
+                          <m:t>d</m:t>
+                        </m:r>
+                        <m:r>
+                          <a:rPr lang="fr-FR"/>
+                          <m:t>−1</m:t>
+                        </m:r>
+                      </m:sup>
+                    </m:sSup>
+                    <m:r>
+                      <a:rPr lang="fr-FR"/>
+                      <m:t>+…+</m:t>
+                    </m:r>
+                    <m:sSub>
+                      <m:sSubPr>
+                        <m:ctrlPr>
+                          <a:rPr lang="fr-FR" i="1"/>
+                        </m:ctrlPr>
+                      </m:sSubPr>
+                      <m:e>
+                        <m:r>
+                          <m:rPr>
+                            <m:sty m:val="p"/>
+                          </m:rPr>
+                          <a:rPr lang="fr-FR"/>
+                          <m:t>a</m:t>
+                        </m:r>
+                      </m:e>
+                      <m:sub>
+                        <m:r>
+                          <a:rPr lang="fr-FR"/>
+                          <m:t>2</m:t>
+                        </m:r>
+                      </m:sub>
+                    </m:sSub>
+                    <m:sSup>
+                      <m:sSupPr>
+                        <m:ctrlPr>
+                          <a:rPr lang="fr-FR" i="1"/>
+                        </m:ctrlPr>
+                      </m:sSupPr>
+                      <m:e>
+                        <m:r>
+                          <m:rPr>
+                            <m:sty m:val="p"/>
+                          </m:rPr>
+                          <a:rPr lang="fr-FR"/>
+                          <m:t>x</m:t>
+                        </m:r>
+                      </m:e>
+                      <m:sup>
+                        <m:r>
+                          <a:rPr lang="fr-FR"/>
+                          <m:t>2</m:t>
+                        </m:r>
+                      </m:sup>
+                    </m:sSup>
+                    <m:r>
+                      <a:rPr lang="fr-FR"/>
+                      <m:t>+</m:t>
+                    </m:r>
+                    <m:sSub>
+                      <m:sSubPr>
+                        <m:ctrlPr>
+                          <a:rPr lang="fr-FR" i="1"/>
+                        </m:ctrlPr>
+                      </m:sSubPr>
+                      <m:e>
+                        <m:r>
+                          <m:rPr>
+                            <m:sty m:val="p"/>
+                          </m:rPr>
+                          <a:rPr lang="fr-FR"/>
+                          <m:t>a</m:t>
+                        </m:r>
+                      </m:e>
+                      <m:sub>
+                        <m:r>
+                          <a:rPr lang="fr-FR"/>
+                          <m:t>1</m:t>
+                        </m:r>
+                      </m:sub>
+                    </m:sSub>
+                    <m:sSup>
+                      <m:sSupPr>
+                        <m:ctrlPr>
+                          <a:rPr lang="fr-FR" i="1"/>
+                        </m:ctrlPr>
+                      </m:sSupPr>
+                      <m:e>
+                        <m:r>
+                          <m:rPr>
+                            <m:sty m:val="p"/>
+                          </m:rPr>
+                          <a:rPr lang="fr-FR"/>
+                          <m:t>x</m:t>
+                        </m:r>
+                      </m:e>
+                      <m:sup>
+                        <m:r>
+                          <a:rPr lang="fr-FR"/>
+                          <m:t>1</m:t>
+                        </m:r>
+                      </m:sup>
+                    </m:sSup>
+                    <m:r>
+                      <a:rPr lang="fr-FR"/>
+                      <m:t>+</m:t>
+                    </m:r>
+                    <m:sSup>
+                      <m:sSupPr>
+                        <m:ctrlPr>
+                          <a:rPr lang="fr-FR" i="1"/>
+                        </m:ctrlPr>
+                      </m:sSupPr>
+                      <m:e>
+                        <m:sSub>
+                          <m:sSubPr>
+                            <m:ctrlPr>
+                              <a:rPr lang="fr-FR" i="1"/>
+                            </m:ctrlPr>
+                          </m:sSubPr>
+                          <m:e>
+                            <m:r>
+                              <m:rPr>
+                                <m:sty m:val="p"/>
+                              </m:rPr>
+                              <a:rPr lang="fr-FR"/>
+                              <m:t>a</m:t>
+                            </m:r>
+                          </m:e>
+                          <m:sub>
+                            <m:r>
+                              <a:rPr lang="fr-FR"/>
+                              <m:t>0</m:t>
+                            </m:r>
+                          </m:sub>
+                        </m:sSub>
+                        <m:r>
+                          <m:rPr>
+                            <m:sty m:val="p"/>
+                          </m:rPr>
+                          <a:rPr lang="fr-FR"/>
+                          <m:t>x</m:t>
+                        </m:r>
+                      </m:e>
+                      <m:sup>
+                        <m:r>
+                          <a:rPr lang="fr-FR"/>
+                          <m:t>0</m:t>
+                        </m:r>
+                      </m:sup>
+                    </m:sSup>
+                  </m:oMath>
+                </a14:m>
+                <a:r>
+                  <a:rPr lang="fr-FR" dirty="0"/>
+                  <a:t> </a:t>
+                </a:r>
+                <a:endParaRPr lang="fr-FR" dirty="0" smtClean="0"/>
+              </a:p>
+              <a:p>
+                <a:pPr marL="342900" indent="-342900" algn="l">
+                  <a:buFontTx/>
+                  <a:buChar char="-"/>
+                </a:pPr>
+                <a:endParaRPr lang="fr-FR" b="0" dirty="0" smtClean="0"/>
+              </a:p>
+              <a:p>
+                <a:pPr marL="342900" indent="-342900" algn="l">
+                  <a:buFont typeface="Arial" charset="0"/>
+                  <a:buChar char="•"/>
+                </a:pPr>
+                <a:r>
+                  <a:rPr lang="fr-FR" b="0" dirty="0" smtClean="0"/>
+                  <a:t>Factorisation :</a:t>
+                </a:r>
+              </a:p>
+              <a:p>
+                <a:pPr algn="l"/>
+                <a:r>
+                  <a:rPr lang="fr-FR" dirty="0"/>
+                  <a:t>	</a:t>
+                </a:r>
+                <a14:m>
+                  <m:oMath xmlns:m="http://schemas.openxmlformats.org/officeDocument/2006/math">
+                    <m:sSub>
+                      <m:sSubPr>
+                        <m:ctrlPr>
+                          <a:rPr lang="fr-FR" i="1"/>
+                        </m:ctrlPr>
+                      </m:sSubPr>
+                      <m:e>
+                        <m:r>
+                          <a:rPr lang="fr-FR"/>
+                          <m:t>[</m:t>
+                        </m:r>
+                        <m:r>
+                          <m:rPr>
+                            <m:sty m:val="p"/>
+                          </m:rPr>
+                          <a:rPr lang="fr-FR"/>
+                          <m:t>a</m:t>
+                        </m:r>
+                      </m:e>
+                      <m:sub>
+                        <m:r>
+                          <m:rPr>
+                            <m:sty m:val="p"/>
+                          </m:rPr>
+                          <a:rPr lang="fr-FR"/>
+                          <m:t>d</m:t>
+                        </m:r>
+                      </m:sub>
+                    </m:sSub>
+                    <m:sSup>
+                      <m:sSupPr>
+                        <m:ctrlPr>
+                          <a:rPr lang="fr-FR" i="1"/>
+                        </m:ctrlPr>
+                      </m:sSupPr>
+                      <m:e>
+                        <m:r>
+                          <m:rPr>
+                            <m:sty m:val="p"/>
+                          </m:rPr>
+                          <a:rPr lang="fr-FR"/>
+                          <m:t>x</m:t>
+                        </m:r>
+                      </m:e>
+                      <m:sup>
+                        <m:r>
+                          <m:rPr>
+                            <m:sty m:val="p"/>
+                          </m:rPr>
+                          <a:rPr lang="fr-FR"/>
+                          <m:t>d</m:t>
+                        </m:r>
+                        <m:r>
+                          <a:rPr lang="fr-FR"/>
+                          <m:t>−1</m:t>
+                        </m:r>
+                      </m:sup>
+                    </m:sSup>
+                    <m:r>
+                      <a:rPr lang="fr-FR"/>
+                      <m:t>+</m:t>
+                    </m:r>
+                    <m:sSub>
+                      <m:sSubPr>
+                        <m:ctrlPr>
+                          <a:rPr lang="fr-FR" i="1"/>
+                        </m:ctrlPr>
+                      </m:sSubPr>
+                      <m:e>
+                        <m:r>
+                          <m:rPr>
+                            <m:sty m:val="p"/>
+                          </m:rPr>
+                          <a:rPr lang="fr-FR"/>
+                          <m:t>a</m:t>
+                        </m:r>
+                      </m:e>
+                      <m:sub>
+                        <m:r>
+                          <m:rPr>
+                            <m:sty m:val="p"/>
+                          </m:rPr>
+                          <a:rPr lang="fr-FR"/>
+                          <m:t>d</m:t>
+                        </m:r>
+                        <m:r>
+                          <a:rPr lang="fr-FR"/>
+                          <m:t>−1</m:t>
+                        </m:r>
+                      </m:sub>
+                    </m:sSub>
+                    <m:sSup>
+                      <m:sSupPr>
+                        <m:ctrlPr>
+                          <a:rPr lang="fr-FR" i="1"/>
+                        </m:ctrlPr>
+                      </m:sSupPr>
+                      <m:e>
+                        <m:r>
+                          <m:rPr>
+                            <m:sty m:val="p"/>
+                          </m:rPr>
+                          <a:rPr lang="fr-FR"/>
+                          <m:t>x</m:t>
+                        </m:r>
+                      </m:e>
+                      <m:sup>
+                        <m:r>
+                          <m:rPr>
+                            <m:sty m:val="p"/>
+                          </m:rPr>
+                          <a:rPr lang="fr-FR"/>
+                          <m:t>d</m:t>
+                        </m:r>
+                        <m:r>
+                          <a:rPr lang="fr-FR"/>
+                          <m:t>−2</m:t>
+                        </m:r>
+                      </m:sup>
+                    </m:sSup>
+                    <m:r>
+                      <a:rPr lang="fr-FR"/>
+                      <m:t>+…+</m:t>
+                    </m:r>
+                    <m:sSub>
+                      <m:sSubPr>
+                        <m:ctrlPr>
+                          <a:rPr lang="fr-FR" i="1"/>
+                        </m:ctrlPr>
+                      </m:sSubPr>
+                      <m:e>
+                        <m:r>
+                          <m:rPr>
+                            <m:sty m:val="p"/>
+                          </m:rPr>
+                          <a:rPr lang="fr-FR"/>
+                          <m:t>a</m:t>
+                        </m:r>
+                      </m:e>
+                      <m:sub>
+                        <m:r>
+                          <a:rPr lang="fr-FR"/>
+                          <m:t>2</m:t>
+                        </m:r>
+                      </m:sub>
+                    </m:sSub>
+                    <m:sSup>
+                      <m:sSupPr>
+                        <m:ctrlPr>
+                          <a:rPr lang="fr-FR" i="1"/>
+                        </m:ctrlPr>
+                      </m:sSupPr>
+                      <m:e>
+                        <m:r>
+                          <m:rPr>
+                            <m:sty m:val="p"/>
+                          </m:rPr>
+                          <a:rPr lang="fr-FR"/>
+                          <m:t>x</m:t>
+                        </m:r>
+                      </m:e>
+                      <m:sup>
+                        <m:r>
+                          <a:rPr lang="fr-FR"/>
+                          <m:t>1</m:t>
+                        </m:r>
+                      </m:sup>
+                    </m:sSup>
+                    <m:r>
+                      <a:rPr lang="fr-FR"/>
+                      <m:t>+</m:t>
+                    </m:r>
+                    <m:sSub>
+                      <m:sSubPr>
+                        <m:ctrlPr>
+                          <a:rPr lang="fr-FR" i="1"/>
+                        </m:ctrlPr>
+                      </m:sSubPr>
+                      <m:e>
+                        <m:r>
+                          <m:rPr>
+                            <m:sty m:val="p"/>
+                          </m:rPr>
+                          <a:rPr lang="fr-FR"/>
+                          <m:t>a</m:t>
+                        </m:r>
+                      </m:e>
+                      <m:sub>
+                        <m:r>
+                          <a:rPr lang="fr-FR"/>
+                          <m:t>1</m:t>
+                        </m:r>
+                      </m:sub>
+                    </m:sSub>
+                    <m:r>
+                      <a:rPr lang="fr-FR"/>
+                      <m:t>]</m:t>
+                    </m:r>
+                    <m:r>
+                      <m:rPr>
+                        <m:sty m:val="p"/>
+                      </m:rPr>
+                      <a:rPr lang="fr-FR"/>
+                      <m:t>x</m:t>
+                    </m:r>
+                    <m:r>
+                      <a:rPr lang="fr-FR"/>
+                      <m:t>+</m:t>
+                    </m:r>
+                    <m:sSub>
+                      <m:sSubPr>
+                        <m:ctrlPr>
+                          <a:rPr lang="fr-FR" i="1"/>
+                        </m:ctrlPr>
+                      </m:sSubPr>
+                      <m:e>
+                        <m:r>
+                          <m:rPr>
+                            <m:sty m:val="p"/>
+                          </m:rPr>
+                          <a:rPr lang="fr-FR"/>
+                          <m:t>a</m:t>
+                        </m:r>
+                      </m:e>
+                      <m:sub>
+                        <m:r>
+                          <a:rPr lang="fr-FR"/>
+                          <m:t>0</m:t>
+                        </m:r>
+                      </m:sub>
+                    </m:sSub>
+                  </m:oMath>
+                </a14:m>
+                <a:r>
+                  <a:rPr lang="fr-FR" dirty="0"/>
+                  <a:t> </a:t>
+                </a:r>
+                <a:endParaRPr lang="fr-FR" dirty="0"/>
+              </a:p>
+              <a:p>
+                <a:pPr algn="l"/>
+                <a:r>
+                  <a:rPr lang="fr-FR" dirty="0" smtClean="0"/>
+                  <a:t>	</a:t>
+                </a:r>
+                <a14:m>
+                  <m:oMath xmlns:m="http://schemas.openxmlformats.org/officeDocument/2006/math">
+                    <m:sSub>
+                      <m:sSubPr>
+                        <m:ctrlPr>
+                          <a:rPr lang="fr-FR" i="1"/>
+                        </m:ctrlPr>
+                      </m:sSubPr>
+                      <m:e>
+                        <m:r>
+                          <a:rPr lang="fr-FR"/>
+                          <m:t>[</m:t>
+                        </m:r>
+                        <m:r>
+                          <m:rPr>
+                            <m:sty m:val="p"/>
+                          </m:rPr>
+                          <a:rPr lang="fr-FR"/>
+                          <m:t>a</m:t>
+                        </m:r>
+                      </m:e>
+                      <m:sub>
+                        <m:r>
+                          <m:rPr>
+                            <m:sty m:val="p"/>
+                          </m:rPr>
+                          <a:rPr lang="fr-FR"/>
+                          <m:t>d</m:t>
+                        </m:r>
+                      </m:sub>
+                    </m:sSub>
+                    <m:sSup>
+                      <m:sSupPr>
+                        <m:ctrlPr>
+                          <a:rPr lang="fr-FR" i="1"/>
+                        </m:ctrlPr>
+                      </m:sSupPr>
+                      <m:e>
+                        <m:r>
+                          <m:rPr>
+                            <m:sty m:val="p"/>
+                          </m:rPr>
+                          <a:rPr lang="fr-FR"/>
+                          <m:t>x</m:t>
+                        </m:r>
+                      </m:e>
+                      <m:sup>
+                        <m:r>
+                          <m:rPr>
+                            <m:sty m:val="p"/>
+                          </m:rPr>
+                          <a:rPr lang="fr-FR"/>
+                          <m:t>d</m:t>
+                        </m:r>
+                        <m:r>
+                          <a:rPr lang="fr-FR"/>
+                          <m:t>−2</m:t>
+                        </m:r>
+                      </m:sup>
+                    </m:sSup>
+                    <m:r>
+                      <a:rPr lang="fr-FR"/>
+                      <m:t>+</m:t>
+                    </m:r>
+                    <m:sSub>
+                      <m:sSubPr>
+                        <m:ctrlPr>
+                          <a:rPr lang="fr-FR" i="1"/>
+                        </m:ctrlPr>
+                      </m:sSubPr>
+                      <m:e>
+                        <m:r>
+                          <m:rPr>
+                            <m:sty m:val="p"/>
+                          </m:rPr>
+                          <a:rPr lang="fr-FR"/>
+                          <m:t>a</m:t>
+                        </m:r>
+                      </m:e>
+                      <m:sub>
+                        <m:r>
+                          <m:rPr>
+                            <m:sty m:val="p"/>
+                          </m:rPr>
+                          <a:rPr lang="fr-FR"/>
+                          <m:t>d</m:t>
+                        </m:r>
+                        <m:r>
+                          <a:rPr lang="fr-FR"/>
+                          <m:t>−1</m:t>
+                        </m:r>
+                      </m:sub>
+                    </m:sSub>
+                    <m:sSup>
+                      <m:sSupPr>
+                        <m:ctrlPr>
+                          <a:rPr lang="fr-FR" i="1"/>
+                        </m:ctrlPr>
+                      </m:sSupPr>
+                      <m:e>
+                        <m:r>
+                          <m:rPr>
+                            <m:sty m:val="p"/>
+                          </m:rPr>
+                          <a:rPr lang="fr-FR"/>
+                          <m:t>x</m:t>
+                        </m:r>
+                      </m:e>
+                      <m:sup>
+                        <m:r>
+                          <m:rPr>
+                            <m:sty m:val="p"/>
+                          </m:rPr>
+                          <a:rPr lang="fr-FR"/>
+                          <m:t>d</m:t>
+                        </m:r>
+                        <m:r>
+                          <a:rPr lang="fr-FR"/>
+                          <m:t>−3</m:t>
+                        </m:r>
+                      </m:sup>
+                    </m:sSup>
+                    <m:r>
+                      <a:rPr lang="fr-FR"/>
+                      <m:t>+…+</m:t>
+                    </m:r>
+                    <m:sSub>
+                      <m:sSubPr>
+                        <m:ctrlPr>
+                          <a:rPr lang="fr-FR" i="1"/>
+                        </m:ctrlPr>
+                      </m:sSubPr>
+                      <m:e>
+                        <m:r>
+                          <m:rPr>
+                            <m:sty m:val="p"/>
+                          </m:rPr>
+                          <a:rPr lang="fr-FR"/>
+                          <m:t>a</m:t>
+                        </m:r>
+                      </m:e>
+                      <m:sub>
+                        <m:r>
+                          <a:rPr lang="fr-FR"/>
+                          <m:t>2</m:t>
+                        </m:r>
+                      </m:sub>
+                    </m:sSub>
+                    <m:r>
+                      <a:rPr lang="fr-FR"/>
+                      <m:t>]</m:t>
+                    </m:r>
+                    <m:r>
+                      <m:rPr>
+                        <m:sty m:val="p"/>
+                      </m:rPr>
+                      <a:rPr lang="fr-FR"/>
+                      <m:t>x</m:t>
+                    </m:r>
+                    <m:r>
+                      <a:rPr lang="fr-FR"/>
+                      <m:t>+</m:t>
+                    </m:r>
+                    <m:sSub>
+                      <m:sSubPr>
+                        <m:ctrlPr>
+                          <a:rPr lang="fr-FR" i="1"/>
+                        </m:ctrlPr>
+                      </m:sSubPr>
+                      <m:e>
+                        <m:r>
+                          <m:rPr>
+                            <m:sty m:val="p"/>
+                          </m:rPr>
+                          <a:rPr lang="fr-FR"/>
+                          <m:t>a</m:t>
+                        </m:r>
+                      </m:e>
+                      <m:sub>
+                        <m:r>
+                          <a:rPr lang="fr-FR"/>
+                          <m:t>1</m:t>
+                        </m:r>
+                      </m:sub>
+                    </m:sSub>
+                    <m:r>
+                      <a:rPr lang="fr-FR"/>
+                      <m:t>]</m:t>
+                    </m:r>
+                    <m:r>
+                      <m:rPr>
+                        <m:sty m:val="p"/>
+                      </m:rPr>
+                      <a:rPr lang="fr-FR"/>
+                      <m:t>x</m:t>
+                    </m:r>
+                    <m:r>
+                      <a:rPr lang="fr-FR"/>
+                      <m:t>+</m:t>
+                    </m:r>
+                    <m:sSub>
+                      <m:sSubPr>
+                        <m:ctrlPr>
+                          <a:rPr lang="fr-FR" i="1"/>
+                        </m:ctrlPr>
+                      </m:sSubPr>
+                      <m:e>
+                        <m:r>
+                          <m:rPr>
+                            <m:sty m:val="p"/>
+                          </m:rPr>
+                          <a:rPr lang="fr-FR"/>
+                          <m:t>a</m:t>
+                        </m:r>
+                      </m:e>
+                      <m:sub>
+                        <m:r>
+                          <a:rPr lang="fr-FR"/>
+                          <m:t>0</m:t>
+                        </m:r>
+                      </m:sub>
+                    </m:sSub>
+                  </m:oMath>
+                </a14:m>
+                <a:r>
+                  <a:rPr lang="fr-FR" dirty="0"/>
+                  <a:t> </a:t>
+                </a:r>
+                <a:endParaRPr lang="fr-FR" dirty="0" smtClean="0"/>
+              </a:p>
+              <a:p>
+                <a:pPr algn="l"/>
+                <a:r>
+                  <a:rPr lang="fr-FR" dirty="0" smtClean="0"/>
+                  <a:t>	Jusqu’à avoir l’écriture de </a:t>
+                </a:r>
+                <a:r>
+                  <a:rPr lang="fr-FR" dirty="0" err="1" smtClean="0"/>
+                  <a:t>H</a:t>
+                </a:r>
+                <a:r>
+                  <a:rPr lang="fr-FR" dirty="0" err="1" smtClean="0"/>
+                  <a:t>örner</a:t>
+                </a:r>
+                <a:r>
+                  <a:rPr lang="fr-FR" dirty="0" smtClean="0"/>
+                  <a:t> :</a:t>
+                </a:r>
+                <a:endParaRPr lang="fr-FR" dirty="0"/>
+              </a:p>
+              <a:p>
+                <a:pPr algn="l"/>
+                <a:r>
+                  <a:rPr lang="fr-FR" dirty="0" smtClean="0"/>
+                  <a:t>	</a:t>
+                </a:r>
+                <a14:m>
+                  <m:oMath xmlns:m="http://schemas.openxmlformats.org/officeDocument/2006/math">
+                    <m:sSub>
+                      <m:sSubPr>
+                        <m:ctrlPr>
+                          <a:rPr lang="fr-FR" i="1"/>
+                        </m:ctrlPr>
+                      </m:sSubPr>
+                      <m:e>
+                        <m:r>
+                          <a:rPr lang="fr-FR"/>
+                          <m:t>[…[</m:t>
+                        </m:r>
+                        <m:r>
+                          <m:rPr>
+                            <m:sty m:val="p"/>
+                          </m:rPr>
+                          <a:rPr lang="fr-FR"/>
+                          <m:t>a</m:t>
+                        </m:r>
+                      </m:e>
+                      <m:sub>
+                        <m:r>
+                          <m:rPr>
+                            <m:sty m:val="p"/>
+                          </m:rPr>
+                          <a:rPr lang="fr-FR"/>
+                          <m:t>d</m:t>
+                        </m:r>
+                      </m:sub>
+                    </m:sSub>
+                    <m:r>
+                      <m:rPr>
+                        <m:sty m:val="p"/>
+                      </m:rPr>
+                      <a:rPr lang="fr-FR"/>
+                      <m:t>x</m:t>
+                    </m:r>
+                    <m:r>
+                      <a:rPr lang="fr-FR"/>
+                      <m:t>+</m:t>
+                    </m:r>
+                    <m:sSub>
+                      <m:sSubPr>
+                        <m:ctrlPr>
+                          <a:rPr lang="fr-FR" i="1"/>
+                        </m:ctrlPr>
+                      </m:sSubPr>
+                      <m:e>
+                        <m:r>
+                          <m:rPr>
+                            <m:sty m:val="p"/>
+                          </m:rPr>
+                          <a:rPr lang="fr-FR"/>
+                          <m:t>a</m:t>
+                        </m:r>
+                      </m:e>
+                      <m:sub>
+                        <m:r>
+                          <m:rPr>
+                            <m:sty m:val="p"/>
+                          </m:rPr>
+                          <a:rPr lang="fr-FR"/>
+                          <m:t>d</m:t>
+                        </m:r>
+                        <m:r>
+                          <a:rPr lang="fr-FR"/>
+                          <m:t>−1</m:t>
+                        </m:r>
+                      </m:sub>
+                    </m:sSub>
+                    <m:r>
+                      <a:rPr lang="fr-FR"/>
+                      <m:t>]</m:t>
+                    </m:r>
+                    <m:r>
+                      <m:rPr>
+                        <m:sty m:val="p"/>
+                      </m:rPr>
+                      <a:rPr lang="fr-FR"/>
+                      <m:t>x</m:t>
+                    </m:r>
+                    <m:r>
+                      <a:rPr lang="fr-FR"/>
+                      <m:t>+</m:t>
+                    </m:r>
+                    <m:sSub>
+                      <m:sSubPr>
+                        <m:ctrlPr>
+                          <a:rPr lang="fr-FR" i="1"/>
+                        </m:ctrlPr>
+                      </m:sSubPr>
+                      <m:e>
+                        <m:r>
+                          <m:rPr>
+                            <m:sty m:val="p"/>
+                          </m:rPr>
+                          <a:rPr lang="fr-FR"/>
+                          <m:t>a</m:t>
+                        </m:r>
+                      </m:e>
+                      <m:sub>
+                        <m:r>
+                          <m:rPr>
+                            <m:sty m:val="p"/>
+                          </m:rPr>
+                          <a:rPr lang="fr-FR"/>
+                          <m:t>d</m:t>
+                        </m:r>
+                        <m:r>
+                          <a:rPr lang="fr-FR"/>
+                          <m:t>−2</m:t>
+                        </m:r>
+                      </m:sub>
+                    </m:sSub>
+                    <m:r>
+                      <a:rPr lang="fr-FR"/>
+                      <m:t>]</m:t>
+                    </m:r>
+                    <m:r>
+                      <m:rPr>
+                        <m:sty m:val="p"/>
+                      </m:rPr>
+                      <a:rPr lang="fr-FR"/>
+                      <m:t>x</m:t>
+                    </m:r>
+                    <m:r>
+                      <a:rPr lang="fr-FR"/>
+                      <m:t>+…+</m:t>
+                    </m:r>
+                    <m:sSub>
+                      <m:sSubPr>
+                        <m:ctrlPr>
+                          <a:rPr lang="fr-FR" i="1"/>
+                        </m:ctrlPr>
+                      </m:sSubPr>
+                      <m:e>
+                        <m:r>
+                          <m:rPr>
+                            <m:sty m:val="p"/>
+                          </m:rPr>
+                          <a:rPr lang="fr-FR"/>
+                          <m:t>a</m:t>
+                        </m:r>
+                      </m:e>
+                      <m:sub>
+                        <m:r>
+                          <a:rPr lang="fr-FR"/>
+                          <m:t>2</m:t>
+                        </m:r>
+                      </m:sub>
+                    </m:sSub>
+                    <m:r>
+                      <a:rPr lang="fr-FR"/>
+                      <m:t>]</m:t>
+                    </m:r>
+                    <m:r>
+                      <m:rPr>
+                        <m:sty m:val="p"/>
+                      </m:rPr>
+                      <a:rPr lang="fr-FR"/>
+                      <m:t>x</m:t>
+                    </m:r>
+                    <m:r>
+                      <a:rPr lang="fr-FR"/>
+                      <m:t>+</m:t>
+                    </m:r>
+                    <m:sSub>
+                      <m:sSubPr>
+                        <m:ctrlPr>
+                          <a:rPr lang="fr-FR" i="1"/>
+                        </m:ctrlPr>
+                      </m:sSubPr>
+                      <m:e>
+                        <m:r>
+                          <m:rPr>
+                            <m:sty m:val="p"/>
+                          </m:rPr>
+                          <a:rPr lang="fr-FR"/>
+                          <m:t>a</m:t>
+                        </m:r>
+                      </m:e>
+                      <m:sub>
+                        <m:r>
+                          <a:rPr lang="fr-FR"/>
+                          <m:t>1</m:t>
+                        </m:r>
+                      </m:sub>
+                    </m:sSub>
+                    <m:r>
+                      <a:rPr lang="fr-FR"/>
+                      <m:t>]</m:t>
+                    </m:r>
+                    <m:r>
+                      <m:rPr>
+                        <m:sty m:val="p"/>
+                      </m:rPr>
+                      <a:rPr lang="fr-FR"/>
+                      <m:t>x</m:t>
+                    </m:r>
+                    <m:r>
+                      <a:rPr lang="fr-FR"/>
+                      <m:t>+</m:t>
+                    </m:r>
+                    <m:sSub>
+                      <m:sSubPr>
+                        <m:ctrlPr>
+                          <a:rPr lang="fr-FR" i="1"/>
+                        </m:ctrlPr>
+                      </m:sSubPr>
+                      <m:e>
+                        <m:r>
+                          <m:rPr>
+                            <m:sty m:val="p"/>
+                          </m:rPr>
+                          <a:rPr lang="fr-FR"/>
+                          <m:t>a</m:t>
+                        </m:r>
+                      </m:e>
+                      <m:sub>
+                        <m:r>
+                          <a:rPr lang="fr-FR"/>
+                          <m:t>0</m:t>
+                        </m:r>
+                      </m:sub>
+                    </m:sSub>
+                  </m:oMath>
+                </a14:m>
+                <a:r>
+                  <a:rPr lang="fr-FR" dirty="0"/>
+                  <a:t> </a:t>
+                </a:r>
+                <a:endParaRPr lang="fr-FR" dirty="0" smtClean="0"/>
+              </a:p>
+              <a:p>
+                <a:pPr algn="l"/>
+                <a:endParaRPr lang="fr-FR" dirty="0"/>
+              </a:p>
+            </p:txBody>
+          </p:sp>
+        </mc:Choice>
+        <mc:Fallback>
+          <p:sp>
+            <p:nvSpPr>
+              <p:cNvPr id="3" name="Sous-titre 2"/>
+              <p:cNvSpPr>
+                <a:spLocks noGrp="1" noRot="1" noChangeAspect="1" noMove="1" noResize="1" noEditPoints="1" noAdjustHandles="1" noChangeArrowheads="1" noChangeShapeType="1" noTextEdit="1"/>
+              </p:cNvSpPr>
+              <p:nvPr>
+                <p:ph type="subTitle" idx="1"/>
+              </p:nvPr>
+            </p:nvSpPr>
+            <p:spPr>
+              <a:xfrm>
+                <a:off x="801985" y="1706327"/>
+                <a:ext cx="10730205" cy="4873096"/>
+              </a:xfrm>
+              <a:blipFill rotWithShape="0">
+                <a:blip r:embed="rId2"/>
+                <a:stretch>
+                  <a:fillRect l="-1193"/>
+                </a:stretch>
+              </a:blipFill>
+            </p:spPr>
+            <p:txBody>
+              <a:bodyPr/>
+              <a:lstStyle/>
+              <a:p>
+                <a:r>
+                  <a:rPr lang="fr-FR">
+                    <a:noFill/>
+                  </a:rPr>
+                  <a:t> </a:t>
+                </a:r>
+              </a:p>
+            </p:txBody>
+          </p:sp>
+        </mc:Fallback>
+      </mc:AlternateContent>
     </p:spTree>
     <p:extLst>
       <p:ext uri="{BB962C8B-B14F-4D97-AF65-F5344CB8AC3E}">
-        <p14:creationId xmlns:p14="http://schemas.microsoft.com/office/powerpoint/2010/main" val="2832537362"/>
+        <p14:creationId xmlns:p14="http://schemas.microsoft.com/office/powerpoint/2010/main" val="1274731216"/>
       </p:ext>
     </p:extLst>
   </p:cSld>
   <p:clrMapOvr>
     <a:masterClrMapping/>
   </p:clrMapOvr>
+  <p:timing>
+    <p:tnLst>
+      <p:par>
+        <p:cTn id="1" dur="indefinite" restart="never" nodeType="tmRoot"/>
+      </p:par>
+    </p:tnLst>
+  </p:timing>
 </p:sld>
 </file>
 
@@ -6606,6 +7718,523 @@
         </p:nvSpPr>
         <p:spPr>
           <a:xfrm>
+            <a:off x="1879777" y="-96395"/>
+            <a:ext cx="8574622" cy="1707081"/>
+          </a:xfrm>
+        </p:spPr>
+        <p:txBody>
+          <a:bodyPr>
+            <a:normAutofit/>
+          </a:bodyPr>
+          <a:lstStyle/>
+          <a:p>
+            <a:pPr algn="ctr"/>
+            <a:r>
+              <a:rPr lang="fr-FR" sz="5000" dirty="0" smtClean="0"/>
+              <a:t>Exemple</a:t>
+            </a:r>
+            <a:endParaRPr lang="fr-FR" sz="5000" dirty="0"/>
+          </a:p>
+        </p:txBody>
+      </p:sp>
+      <mc:AlternateContent xmlns:mc="http://schemas.openxmlformats.org/markup-compatibility/2006">
+        <mc:Choice xmlns:a14="http://schemas.microsoft.com/office/drawing/2010/main" Requires="a14">
+          <p:sp>
+            <p:nvSpPr>
+              <p:cNvPr id="3" name="Sous-titre 2"/>
+              <p:cNvSpPr>
+                <a:spLocks noGrp="1"/>
+              </p:cNvSpPr>
+              <p:nvPr>
+                <p:ph type="subTitle" idx="1"/>
+              </p:nvPr>
+            </p:nvSpPr>
+            <p:spPr>
+              <a:xfrm>
+                <a:off x="801985" y="1706327"/>
+                <a:ext cx="10730205" cy="4873096"/>
+              </a:xfrm>
+            </p:spPr>
+            <p:txBody>
+              <a:bodyPr>
+                <a:normAutofit/>
+              </a:bodyPr>
+              <a:lstStyle/>
+              <a:p>
+                <a:pPr marL="342900" indent="-342900" algn="l">
+                  <a:buFontTx/>
+                  <a:buChar char="-"/>
+                </a:pPr>
+                <a:endParaRPr lang="fr-FR" dirty="0" smtClean="0"/>
+              </a:p>
+              <a:p>
+                <a:pPr marL="342900" indent="-342900" algn="l">
+                  <a:buFont typeface="Arial" charset="0"/>
+                  <a:buChar char="•"/>
+                </a:pPr>
+                <a:r>
+                  <a:rPr lang="fr-FR" b="0" dirty="0" smtClean="0"/>
+                  <a:t>Calcul de l’écriture : </a:t>
+                </a:r>
+                <a14:m>
+                  <m:oMath xmlns:m="http://schemas.openxmlformats.org/officeDocument/2006/math">
+                    <m:sSup>
+                      <m:sSupPr>
+                        <m:ctrlPr>
+                          <a:rPr lang="fr-FR" i="1">
+                            <a:latin typeface="Cambria Math" charset="0"/>
+                          </a:rPr>
+                        </m:ctrlPr>
+                      </m:sSupPr>
+                      <m:e>
+                        <m:r>
+                          <a:rPr lang="fr-FR" b="0" i="0" smtClean="0">
+                            <a:latin typeface="Cambria Math" charset="0"/>
+                          </a:rPr>
+                          <m:t>3</m:t>
+                        </m:r>
+                      </m:e>
+                      <m:sup>
+                        <m:r>
+                          <a:rPr lang="fr-FR" b="0" i="0" smtClean="0">
+                            <a:latin typeface="Cambria Math" charset="0"/>
+                          </a:rPr>
+                          <m:t>9</m:t>
+                        </m:r>
+                      </m:sup>
+                    </m:sSup>
+                  </m:oMath>
+                </a14:m>
+                <a:endParaRPr lang="fr-FR" b="0" dirty="0" smtClean="0"/>
+              </a:p>
+              <a:p>
+                <a:pPr marL="342900" indent="-342900" algn="l">
+                  <a:buFont typeface="Arial" charset="0"/>
+                  <a:buChar char="•"/>
+                </a:pPr>
+                <a14:m>
+                  <m:oMath xmlns:m="http://schemas.openxmlformats.org/officeDocument/2006/math">
+                    <m:r>
+                      <a:rPr lang="fr-FR" i="1">
+                        <a:latin typeface="Cambria Math" charset="0"/>
+                      </a:rPr>
+                      <m:t>9=1001 </m:t>
+                    </m:r>
+                  </m:oMath>
+                </a14:m>
+                <a:r>
+                  <a:rPr lang="fr-FR" b="0" dirty="0" smtClean="0"/>
+                  <a:t>en </a:t>
+                </a:r>
+                <a:r>
+                  <a:rPr lang="fr-FR" dirty="0"/>
+                  <a:t>base </a:t>
+                </a:r>
+                <a14:m>
+                  <m:oMath xmlns:m="http://schemas.openxmlformats.org/officeDocument/2006/math">
+                    <m:r>
+                      <a:rPr lang="fr-FR" i="1">
+                        <a:latin typeface="Cambria Math" charset="0"/>
+                      </a:rPr>
+                      <m:t>2</m:t>
+                    </m:r>
+                  </m:oMath>
+                </a14:m>
+                <a:r>
+                  <a:rPr lang="fr-FR" dirty="0"/>
+                  <a:t> </a:t>
+                </a:r>
+                <a:endParaRPr lang="fr-FR" b="0" dirty="0" smtClean="0"/>
+              </a:p>
+              <a:p>
+                <a:pPr marL="342900" indent="-342900" algn="l">
+                  <a:buFont typeface="Arial" charset="0"/>
+                  <a:buChar char="•"/>
+                </a:pPr>
+                <a:r>
+                  <a:rPr lang="fr-FR" dirty="0" smtClean="0"/>
+                  <a:t>Utilisation de l’écriture de </a:t>
+                </a:r>
+                <a:r>
+                  <a:rPr lang="fr-FR" dirty="0" err="1" smtClean="0"/>
+                  <a:t>H</a:t>
+                </a:r>
+                <a:r>
+                  <a:rPr lang="fr-FR" dirty="0" err="1" smtClean="0"/>
+                  <a:t>örner</a:t>
+                </a:r>
+                <a:r>
+                  <a:rPr lang="fr-FR" dirty="0" smtClean="0"/>
+                  <a:t> :</a:t>
+                </a:r>
+                <a:endParaRPr lang="fr-FR" dirty="0"/>
+              </a:p>
+              <a:p>
+                <a:pPr algn="l"/>
+                <a14:m>
+                  <m:oMathPara xmlns:m="http://schemas.openxmlformats.org/officeDocument/2006/math">
+                    <m:oMathParaPr>
+                      <m:jc m:val="centerGroup"/>
+                    </m:oMathParaPr>
+                    <m:oMath xmlns:m="http://schemas.openxmlformats.org/officeDocument/2006/math">
+                      <m:sSup>
+                        <m:sSupPr>
+                          <m:ctrlPr>
+                            <a:rPr lang="fr-FR" i="1">
+                              <a:latin typeface="Cambria Math" charset="0"/>
+                            </a:rPr>
+                          </m:ctrlPr>
+                        </m:sSupPr>
+                        <m:e>
+                          <m:r>
+                            <a:rPr lang="fr-FR" i="1">
+                              <a:latin typeface="Cambria Math" charset="0"/>
+                            </a:rPr>
+                            <m:t>𝑥</m:t>
+                          </m:r>
+                        </m:e>
+                        <m:sup>
+                          <m:r>
+                            <a:rPr lang="fr-FR">
+                              <a:latin typeface="Cambria Math" charset="0"/>
+                            </a:rPr>
+                            <m:t>3</m:t>
+                          </m:r>
+                        </m:sup>
+                      </m:sSup>
+                      <m:r>
+                        <a:rPr lang="fr-FR" i="1">
+                          <a:latin typeface="Cambria Math" charset="0"/>
+                        </a:rPr>
+                        <m:t>+1</m:t>
+                      </m:r>
+                    </m:oMath>
+                  </m:oMathPara>
+                </a14:m>
+                <a:endParaRPr lang="fr-FR" dirty="0"/>
+              </a:p>
+              <a:p>
+                <a:pPr algn="l"/>
+                <a14:m>
+                  <m:oMathPara xmlns:m="http://schemas.openxmlformats.org/officeDocument/2006/math">
+                    <m:oMathParaPr>
+                      <m:jc m:val="centerGroup"/>
+                    </m:oMathParaPr>
+                    <m:oMath xmlns:m="http://schemas.openxmlformats.org/officeDocument/2006/math">
+                      <m:sSup>
+                        <m:sSupPr>
+                          <m:ctrlPr>
+                            <a:rPr lang="fr-FR" i="1">
+                              <a:latin typeface="Cambria Math" charset="0"/>
+                            </a:rPr>
+                          </m:ctrlPr>
+                        </m:sSupPr>
+                        <m:e>
+                          <m:r>
+                            <a:rPr lang="fr-FR" i="1">
+                              <a:latin typeface="Cambria Math" charset="0"/>
+                            </a:rPr>
+                            <m:t>(</m:t>
+                          </m:r>
+                          <m:r>
+                            <a:rPr lang="fr-FR" i="1">
+                              <a:latin typeface="Cambria Math" charset="0"/>
+                            </a:rPr>
+                            <m:t>𝑥</m:t>
+                          </m:r>
+                        </m:e>
+                        <m:sup>
+                          <m:r>
+                            <a:rPr lang="fr-FR">
+                              <a:latin typeface="Cambria Math" charset="0"/>
+                            </a:rPr>
+                            <m:t>2</m:t>
+                          </m:r>
+                        </m:sup>
+                      </m:sSup>
+                      <m:r>
+                        <a:rPr lang="fr-FR" i="1">
+                          <a:latin typeface="Cambria Math" charset="0"/>
+                        </a:rPr>
+                        <m:t>)</m:t>
+                      </m:r>
+                      <m:r>
+                        <a:rPr lang="fr-FR" i="1">
+                          <a:latin typeface="Cambria Math" charset="0"/>
+                        </a:rPr>
+                        <m:t>𝑥</m:t>
+                      </m:r>
+                      <m:r>
+                        <a:rPr lang="fr-FR" i="1">
+                          <a:latin typeface="Cambria Math" charset="0"/>
+                        </a:rPr>
+                        <m:t>+1</m:t>
+                      </m:r>
+                    </m:oMath>
+                  </m:oMathPara>
+                </a14:m>
+                <a:endParaRPr lang="fr-FR" dirty="0"/>
+              </a:p>
+              <a:p>
+                <a:pPr algn="l"/>
+                <a14:m>
+                  <m:oMathPara xmlns:m="http://schemas.openxmlformats.org/officeDocument/2006/math">
+                    <m:oMathParaPr>
+                      <m:jc m:val="centerGroup"/>
+                    </m:oMathParaPr>
+                    <m:oMath xmlns:m="http://schemas.openxmlformats.org/officeDocument/2006/math">
+                      <m:d>
+                        <m:dPr>
+                          <m:ctrlPr>
+                            <a:rPr lang="fr-FR" i="1">
+                              <a:latin typeface="Cambria Math" charset="0"/>
+                            </a:rPr>
+                          </m:ctrlPr>
+                        </m:dPr>
+                        <m:e>
+                          <m:d>
+                            <m:dPr>
+                              <m:ctrlPr>
+                                <a:rPr lang="fr-FR" i="1">
+                                  <a:latin typeface="Cambria Math" charset="0"/>
+                                </a:rPr>
+                              </m:ctrlPr>
+                            </m:dPr>
+                            <m:e>
+                              <m:r>
+                                <a:rPr lang="fr-FR" i="1">
+                                  <a:latin typeface="Cambria Math" charset="0"/>
+                                </a:rPr>
+                                <m:t>𝑥</m:t>
+                              </m:r>
+                            </m:e>
+                          </m:d>
+                          <m:r>
+                            <a:rPr lang="fr-FR" i="1">
+                              <a:latin typeface="Cambria Math" charset="0"/>
+                            </a:rPr>
+                            <m:t>𝑥</m:t>
+                          </m:r>
+                        </m:e>
+                      </m:d>
+                      <m:r>
+                        <a:rPr lang="fr-FR" i="1">
+                          <a:latin typeface="Cambria Math" charset="0"/>
+                        </a:rPr>
+                        <m:t>𝑥</m:t>
+                      </m:r>
+                      <m:r>
+                        <a:rPr lang="fr-FR" i="1">
+                          <a:latin typeface="Cambria Math" charset="0"/>
+                        </a:rPr>
+                        <m:t>+1</m:t>
+                      </m:r>
+                    </m:oMath>
+                  </m:oMathPara>
+                </a14:m>
+                <a:endParaRPr lang="fr-FR" dirty="0" smtClean="0"/>
+              </a:p>
+              <a:p>
+                <a:pPr marL="342900" indent="-342900" algn="l">
+                  <a:buFont typeface="Arial" charset="0"/>
+                  <a:buChar char="•"/>
+                </a:pPr>
+                <a:r>
+                  <a:rPr lang="fr-FR" dirty="0" smtClean="0"/>
+                  <a:t>Résultat : </a:t>
+                </a:r>
+                <a14:m>
+                  <m:oMath xmlns:m="http://schemas.openxmlformats.org/officeDocument/2006/math">
+                    <m:sSup>
+                      <m:sSupPr>
+                        <m:ctrlPr>
+                          <a:rPr lang="fr-FR" i="1" smtClean="0">
+                            <a:latin typeface="Cambria Math" charset="0"/>
+                          </a:rPr>
+                        </m:ctrlPr>
+                      </m:sSupPr>
+                      <m:e>
+                        <m:r>
+                          <a:rPr lang="fr-FR" b="0" i="1" smtClean="0">
+                            <a:latin typeface="Cambria Math" charset="0"/>
+                          </a:rPr>
+                          <m:t>3</m:t>
+                        </m:r>
+                      </m:e>
+                      <m:sup>
+                        <m:sSup>
+                          <m:sSupPr>
+                            <m:ctrlPr>
+                              <a:rPr lang="fr-FR" i="1" smtClean="0">
+                                <a:latin typeface="Cambria Math" charset="0"/>
+                              </a:rPr>
+                            </m:ctrlPr>
+                          </m:sSupPr>
+                          <m:e>
+                            <m:r>
+                              <a:rPr lang="fr-FR" b="0" i="1" smtClean="0">
+                                <a:latin typeface="Cambria Math" charset="0"/>
+                              </a:rPr>
+                              <m:t>2</m:t>
+                            </m:r>
+                          </m:e>
+                          <m:sup>
+                            <m:r>
+                              <a:rPr lang="fr-FR" b="0" i="1" smtClean="0">
+                                <a:latin typeface="Cambria Math" charset="0"/>
+                              </a:rPr>
+                              <m:t>(</m:t>
+                            </m:r>
+                            <m:sSup>
+                              <m:sSupPr>
+                                <m:ctrlPr>
+                                  <a:rPr lang="fr-FR" b="0" i="1" smtClean="0">
+                                    <a:latin typeface="Cambria Math" charset="0"/>
+                                  </a:rPr>
+                                </m:ctrlPr>
+                              </m:sSupPr>
+                              <m:e>
+                                <m:r>
+                                  <a:rPr lang="fr-FR" b="0" i="1" smtClean="0">
+                                    <a:latin typeface="Cambria Math" charset="0"/>
+                                  </a:rPr>
+                                  <m:t>2</m:t>
+                                </m:r>
+                              </m:e>
+                              <m:sup>
+                                <m:r>
+                                  <a:rPr lang="fr-FR" b="0" i="1" smtClean="0">
+                                    <a:latin typeface="Cambria Math" charset="0"/>
+                                  </a:rPr>
+                                  <m:t>2</m:t>
+                                </m:r>
+                              </m:sup>
+                            </m:sSup>
+                            <m:r>
+                              <a:rPr lang="fr-FR" b="0" i="1" smtClean="0">
+                                <a:latin typeface="Cambria Math" charset="0"/>
+                              </a:rPr>
+                              <m:t>)</m:t>
+                            </m:r>
+                          </m:sup>
+                        </m:sSup>
+                      </m:sup>
+                    </m:sSup>
+                    <m:r>
+                      <a:rPr lang="fr-FR" b="0" i="1" smtClean="0">
+                        <a:latin typeface="Cambria Math" charset="0"/>
+                      </a:rPr>
+                      <m:t>∗3=19683</m:t>
+                    </m:r>
+                  </m:oMath>
+                </a14:m>
+                <a:endParaRPr lang="fr-FR" dirty="0" smtClean="0"/>
+              </a:p>
+              <a:p>
+                <a:pPr marL="342900" indent="-342900" algn="l">
+                  <a:buFontTx/>
+                  <a:buChar char="-"/>
+                </a:pPr>
+                <a:endParaRPr lang="fr-FR" dirty="0" smtClean="0"/>
+              </a:p>
+              <a:p>
+                <a:pPr algn="l"/>
+                <a:endParaRPr lang="fr-FR" dirty="0"/>
+              </a:p>
+              <a:p>
+                <a:pPr algn="l"/>
+                <a:endParaRPr lang="fr-FR" b="0" dirty="0" smtClean="0"/>
+              </a:p>
+            </p:txBody>
+          </p:sp>
+        </mc:Choice>
+        <mc:Fallback>
+          <p:sp>
+            <p:nvSpPr>
+              <p:cNvPr id="3" name="Sous-titre 2"/>
+              <p:cNvSpPr>
+                <a:spLocks noGrp="1" noRot="1" noChangeAspect="1" noMove="1" noResize="1" noEditPoints="1" noAdjustHandles="1" noChangeArrowheads="1" noChangeShapeType="1" noTextEdit="1"/>
+              </p:cNvSpPr>
+              <p:nvPr>
+                <p:ph type="subTitle" idx="1"/>
+              </p:nvPr>
+            </p:nvSpPr>
+            <p:spPr>
+              <a:xfrm>
+                <a:off x="801985" y="1706327"/>
+                <a:ext cx="10730205" cy="4873096"/>
+              </a:xfrm>
+              <a:blipFill rotWithShape="0">
+                <a:blip r:embed="rId2"/>
+                <a:stretch>
+                  <a:fillRect l="-1193"/>
+                </a:stretch>
+              </a:blipFill>
+            </p:spPr>
+            <p:txBody>
+              <a:bodyPr/>
+              <a:lstStyle/>
+              <a:p>
+                <a:r>
+                  <a:rPr lang="fr-FR">
+                    <a:noFill/>
+                  </a:rPr>
+                  <a:t> </a:t>
+                </a:r>
+              </a:p>
+            </p:txBody>
+          </p:sp>
+        </mc:Fallback>
+      </mc:AlternateContent>
+    </p:spTree>
+    <p:extLst>
+      <p:ext uri="{BB962C8B-B14F-4D97-AF65-F5344CB8AC3E}">
+        <p14:creationId xmlns:p14="http://schemas.microsoft.com/office/powerpoint/2010/main" val="1355154822"/>
+      </p:ext>
+    </p:extLst>
+  </p:cSld>
+  <p:clrMapOvr>
+    <a:masterClrMapping/>
+  </p:clrMapOvr>
+  <p:timing>
+    <p:tnLst>
+      <p:par>
+        <p:cTn id="1" dur="indefinite" restart="never" nodeType="tmRoot"/>
+      </p:par>
+    </p:tnLst>
+  </p:timing>
+</p:sld>
+</file>
+
+<file path=ppt/slides/slide6.xml><?xml version="1.0" encoding="utf-8"?>
+<p:sld xmlns:a="http://schemas.openxmlformats.org/drawingml/2006/main" xmlns:r="http://schemas.openxmlformats.org/officeDocument/2006/relationships" xmlns:p="http://schemas.openxmlformats.org/presentationml/2006/main" showMasterSp="0">
+  <p:cSld>
+    <p:spTree>
+      <p:nvGrpSpPr>
+        <p:cNvPr id="1" name=""/>
+        <p:cNvGrpSpPr/>
+        <p:nvPr/>
+      </p:nvGrpSpPr>
+      <p:grpSpPr>
+        <a:xfrm>
+          <a:off x="0" y="0"/>
+          <a:ext cx="0" cy="0"/>
+          <a:chOff x="0" y="0"/>
+          <a:chExt cx="0" cy="0"/>
+        </a:xfrm>
+      </p:grpSpPr>
+      <p:sp>
+        <p:nvSpPr>
+          <p:cNvPr id="2" name="Titre 1"/>
+          <p:cNvSpPr>
+            <a:spLocks noGrp="1"/>
+          </p:cNvSpPr>
+          <p:nvPr>
+            <p:ph type="ctrTitle"/>
+          </p:nvPr>
+        </p:nvSpPr>
+        <p:spPr>
+          <a:xfrm>
             <a:off x="1879777" y="-96394"/>
             <a:ext cx="8574622" cy="1196146"/>
           </a:xfrm>
@@ -6654,6 +8283,34 @@
           </a:p>
         </p:txBody>
       </p:sp>
+      <p:pic>
+        <p:nvPicPr>
+          <p:cNvPr id="6" name="Image 5"/>
+          <p:cNvPicPr/>
+          <p:nvPr/>
+        </p:nvPicPr>
+        <p:blipFill>
+          <a:blip r:embed="rId2">
+            <a:extLst>
+              <a:ext uri="{28A0092B-C50C-407E-A947-70E740481C1C}">
+                <a14:useLocalDpi xmlns:a14="http://schemas.microsoft.com/office/drawing/2010/main" val="0"/>
+              </a:ext>
+            </a:extLst>
+          </a:blip>
+          <a:stretch>
+            <a:fillRect/>
+          </a:stretch>
+        </p:blipFill>
+        <p:spPr>
+          <a:xfrm>
+            <a:off x="2369044" y="1824281"/>
+            <a:ext cx="7596087" cy="4189860"/>
+          </a:xfrm>
+          <a:prstGeom prst="rect">
+            <a:avLst/>
+          </a:prstGeom>
+        </p:spPr>
+      </p:pic>
     </p:spTree>
     <p:extLst>
       <p:ext uri="{BB962C8B-B14F-4D97-AF65-F5344CB8AC3E}">
@@ -6664,10 +8321,17 @@
   <p:clrMapOvr>
     <a:masterClrMapping/>
   </p:clrMapOvr>
+  <p:timing>
+    <p:tnLst>
+      <p:par>
+        <p:cTn id="1" dur="indefinite" restart="never" nodeType="tmRoot"/>
+      </p:par>
+    </p:tnLst>
+  </p:timing>
 </p:sld>
 </file>
 
-<file path=ppt/slides/slide6.xml><?xml version="1.0" encoding="utf-8"?>
+<file path=ppt/slides/slide7.xml><?xml version="1.0" encoding="utf-8"?>
 <p:sld xmlns:a="http://schemas.openxmlformats.org/drawingml/2006/main" xmlns:r="http://schemas.openxmlformats.org/officeDocument/2006/relationships" xmlns:p="http://schemas.openxmlformats.org/presentationml/2006/main" showMasterSp="0">
   <p:cSld>
     <p:spTree>
@@ -6880,10 +8544,17 @@
   <p:clrMapOvr>
     <a:masterClrMapping/>
   </p:clrMapOvr>
+  <p:timing>
+    <p:tnLst>
+      <p:par>
+        <p:cTn id="1" dur="indefinite" restart="never" nodeType="tmRoot"/>
+      </p:par>
+    </p:tnLst>
+  </p:timing>
 </p:sld>
 </file>
 
-<file path=ppt/slides/slide7.xml><?xml version="1.0" encoding="utf-8"?>
+<file path=ppt/slides/slide8.xml><?xml version="1.0" encoding="utf-8"?>
 <p:sld xmlns:a="http://schemas.openxmlformats.org/drawingml/2006/main" xmlns:r="http://schemas.openxmlformats.org/officeDocument/2006/relationships" xmlns:p="http://schemas.openxmlformats.org/presentationml/2006/main" showMasterSp="0">
   <p:cSld>
     <p:spTree>
@@ -7020,10 +8691,17 @@
   <p:clrMapOvr>
     <a:masterClrMapping/>
   </p:clrMapOvr>
+  <p:timing>
+    <p:tnLst>
+      <p:par>
+        <p:cTn id="1" dur="indefinite" restart="never" nodeType="tmRoot"/>
+      </p:par>
+    </p:tnLst>
+  </p:timing>
 </p:sld>
 </file>
 
-<file path=ppt/slides/slide8.xml><?xml version="1.0" encoding="utf-8"?>
+<file path=ppt/slides/slide9.xml><?xml version="1.0" encoding="utf-8"?>
 <p:sld xmlns:a="http://schemas.openxmlformats.org/drawingml/2006/main" xmlns:r="http://schemas.openxmlformats.org/officeDocument/2006/relationships" xmlns:p="http://schemas.openxmlformats.org/presentationml/2006/main" showMasterSp="0">
   <p:cSld>
     <p:spTree>

</xml_diff>